<commit_message>
Some final tweaks to presentation
</commit_message>
<xml_diff>
--- a/WVSE-GraphViz-Dot.pptx
+++ b/WVSE-GraphViz-Dot.pptx
@@ -11,6 +11,7 @@
     <p:sldId id="259" r:id="rId5"/>
     <p:sldId id="260" r:id="rId6"/>
     <p:sldId id="261" r:id="rId7"/>
+    <p:sldId id="262" r:id="rId8"/>
   </p:sldIdLst>
   <p:sldSz cx="12192000" cy="6858000"/>
   <p:notesSz cx="6858000" cy="9144000"/>
@@ -115,7 +116,7 @@
 <file path=ppt/revisionInfo.xml><?xml version="1.0" encoding="utf-8"?>
 <p1510:revInfo xmlns:a="http://schemas.openxmlformats.org/drawingml/2006/main" xmlns:r="http://schemas.openxmlformats.org/officeDocument/2006/relationships" xmlns:p1510="http://schemas.microsoft.com/office/powerpoint/2015/10/main">
   <p1510:revLst>
-    <p1510:client id="{00D38786-CD10-4F94-88C5-472D689EF0BE}" v="1072" dt="2018-08-02T19:20:51.389"/>
+    <p1510:client id="{00D38786-CD10-4F94-88C5-472D689EF0BE}" v="1115" dt="2018-08-02T19:33:26.010"/>
   </p1510:revLst>
 </p1510:revInfo>
 </file>
@@ -125,7 +126,7 @@
   <pc:docChgLst>
     <pc:chgData userId="f4db449474cb4b0d" providerId="LiveId" clId="{00D38786-CD10-4F94-88C5-472D689EF0BE}"/>
     <pc:docChg chg="undo custSel mod addSld delSld modSld">
-      <pc:chgData name="" userId="f4db449474cb4b0d" providerId="LiveId" clId="{00D38786-CD10-4F94-88C5-472D689EF0BE}" dt="2018-08-02T19:20:51.389" v="1067" actId="14100"/>
+      <pc:chgData name="" userId="f4db449474cb4b0d" providerId="LiveId" clId="{00D38786-CD10-4F94-88C5-472D689EF0BE}" dt="2018-08-02T19:33:26.010" v="1110" actId="26606"/>
       <pc:docMkLst>
         <pc:docMk/>
       </pc:docMkLst>
@@ -278,14 +279,14 @@
           </ac:spMkLst>
         </pc:spChg>
       </pc:sldChg>
-      <pc:sldChg chg="modSp add">
-        <pc:chgData name="" userId="f4db449474cb4b0d" providerId="LiveId" clId="{00D38786-CD10-4F94-88C5-472D689EF0BE}" dt="2018-08-02T19:03:42.391" v="919" actId="20577"/>
+      <pc:sldChg chg="modSp add mod setBg">
+        <pc:chgData name="" userId="f4db449474cb4b0d" providerId="LiveId" clId="{00D38786-CD10-4F94-88C5-472D689EF0BE}" dt="2018-08-02T19:33:26.010" v="1110" actId="26606"/>
         <pc:sldMkLst>
           <pc:docMk/>
           <pc:sldMk cId="3914447399" sldId="260"/>
         </pc:sldMkLst>
         <pc:spChg chg="mod">
-          <ac:chgData name="" userId="f4db449474cb4b0d" providerId="LiveId" clId="{00D38786-CD10-4F94-88C5-472D689EF0BE}" dt="2018-08-02T18:57:09.641" v="421" actId="20577"/>
+          <ac:chgData name="" userId="f4db449474cb4b0d" providerId="LiveId" clId="{00D38786-CD10-4F94-88C5-472D689EF0BE}" dt="2018-08-02T19:33:26.010" v="1110" actId="26606"/>
           <ac:spMkLst>
             <pc:docMk/>
             <pc:sldMk cId="3914447399" sldId="260"/>
@@ -293,7 +294,7 @@
           </ac:spMkLst>
         </pc:spChg>
         <pc:spChg chg="mod">
-          <ac:chgData name="" userId="f4db449474cb4b0d" providerId="LiveId" clId="{00D38786-CD10-4F94-88C5-472D689EF0BE}" dt="2018-08-02T19:03:42.391" v="919" actId="20577"/>
+          <ac:chgData name="" userId="f4db449474cb4b0d" providerId="LiveId" clId="{00D38786-CD10-4F94-88C5-472D689EF0BE}" dt="2018-08-02T19:33:26.010" v="1110" actId="26606"/>
           <ac:spMkLst>
             <pc:docMk/>
             <pc:sldMk cId="3914447399" sldId="260"/>
@@ -301,14 +302,14 @@
           </ac:spMkLst>
         </pc:spChg>
       </pc:sldChg>
-      <pc:sldChg chg="modSp add">
-        <pc:chgData name="" userId="f4db449474cb4b0d" providerId="LiveId" clId="{00D38786-CD10-4F94-88C5-472D689EF0BE}" dt="2018-08-02T19:19:05.177" v="1053" actId="20577"/>
+      <pc:sldChg chg="modSp add mod setBg">
+        <pc:chgData name="" userId="f4db449474cb4b0d" providerId="LiveId" clId="{00D38786-CD10-4F94-88C5-472D689EF0BE}" dt="2018-08-02T19:33:21.206" v="1109" actId="255"/>
         <pc:sldMkLst>
           <pc:docMk/>
           <pc:sldMk cId="2129563506" sldId="261"/>
         </pc:sldMkLst>
         <pc:spChg chg="mod">
-          <ac:chgData name="" userId="f4db449474cb4b0d" providerId="LiveId" clId="{00D38786-CD10-4F94-88C5-472D689EF0BE}" dt="2018-08-02T18:58:34.037" v="637" actId="20577"/>
+          <ac:chgData name="" userId="f4db449474cb4b0d" providerId="LiveId" clId="{00D38786-CD10-4F94-88C5-472D689EF0BE}" dt="2018-08-02T19:33:05.435" v="1108" actId="26606"/>
           <ac:spMkLst>
             <pc:docMk/>
             <pc:sldMk cId="2129563506" sldId="261"/>
@@ -316,13 +317,44 @@
           </ac:spMkLst>
         </pc:spChg>
         <pc:spChg chg="mod">
-          <ac:chgData name="" userId="f4db449474cb4b0d" providerId="LiveId" clId="{00D38786-CD10-4F94-88C5-472D689EF0BE}" dt="2018-08-02T19:19:05.177" v="1053" actId="20577"/>
+          <ac:chgData name="" userId="f4db449474cb4b0d" providerId="LiveId" clId="{00D38786-CD10-4F94-88C5-472D689EF0BE}" dt="2018-08-02T19:33:21.206" v="1109" actId="255"/>
           <ac:spMkLst>
             <pc:docMk/>
             <pc:sldMk cId="2129563506" sldId="261"/>
             <ac:spMk id="3" creationId="{0A495BF7-E4B2-458D-BBA2-B88EA9D0A151}"/>
           </ac:spMkLst>
         </pc:spChg>
+      </pc:sldChg>
+      <pc:sldChg chg="addSp modSp add mod setBg">
+        <pc:chgData name="" userId="f4db449474cb4b0d" providerId="LiveId" clId="{00D38786-CD10-4F94-88C5-472D689EF0BE}" dt="2018-08-02T19:32:54.654" v="1107" actId="26606"/>
+        <pc:sldMkLst>
+          <pc:docMk/>
+          <pc:sldMk cId="1149300295" sldId="262"/>
+        </pc:sldMkLst>
+        <pc:spChg chg="mod">
+          <ac:chgData name="" userId="f4db449474cb4b0d" providerId="LiveId" clId="{00D38786-CD10-4F94-88C5-472D689EF0BE}" dt="2018-08-02T19:32:54.654" v="1107" actId="26606"/>
+          <ac:spMkLst>
+            <pc:docMk/>
+            <pc:sldMk cId="1149300295" sldId="262"/>
+            <ac:spMk id="2" creationId="{522CEEE6-AAF2-4A81-BE28-44E6B2B115ED}"/>
+          </ac:spMkLst>
+        </pc:spChg>
+        <pc:spChg chg="mod">
+          <ac:chgData name="" userId="f4db449474cb4b0d" providerId="LiveId" clId="{00D38786-CD10-4F94-88C5-472D689EF0BE}" dt="2018-08-02T19:32:54.654" v="1107" actId="26606"/>
+          <ac:spMkLst>
+            <pc:docMk/>
+            <pc:sldMk cId="1149300295" sldId="262"/>
+            <ac:spMk id="3" creationId="{71D8C61D-4AF1-4B90-ACDC-20B2CAB4F902}"/>
+          </ac:spMkLst>
+        </pc:spChg>
+        <pc:picChg chg="add">
+          <ac:chgData name="" userId="f4db449474cb4b0d" providerId="LiveId" clId="{00D38786-CD10-4F94-88C5-472D689EF0BE}" dt="2018-08-02T19:32:54.654" v="1107" actId="26606"/>
+          <ac:picMkLst>
+            <pc:docMk/>
+            <pc:sldMk cId="1149300295" sldId="262"/>
+            <ac:picMk id="7" creationId="{500A75E3-B46F-480A-8377-816C57EA0780}"/>
+          </ac:picMkLst>
+        </pc:picChg>
       </pc:sldChg>
       <pc:sldChg chg="add del">
         <pc:chgData name="" userId="f4db449474cb4b0d" providerId="LiveId" clId="{00D38786-CD10-4F94-88C5-472D689EF0BE}" dt="2018-08-02T19:19:18.837" v="1055" actId="2696"/>
@@ -6682,6 +6714,21 @@
 <file path=ppt/slides/slide5.xml><?xml version="1.0" encoding="utf-8"?>
 <p:sld xmlns:a="http://schemas.openxmlformats.org/drawingml/2006/main" xmlns:r="http://schemas.openxmlformats.org/officeDocument/2006/relationships" xmlns:p="http://schemas.openxmlformats.org/presentationml/2006/main">
   <p:cSld>
+    <p:bg>
+      <p:bgPr>
+        <a:blipFill dpi="0" rotWithShape="1">
+          <a:blip r:embed="rId2">
+            <a:lum/>
+            <a:extLst/>
+          </a:blip>
+          <a:srcRect/>
+          <a:stretch>
+            <a:fillRect/>
+          </a:stretch>
+        </a:blipFill>
+        <a:effectLst/>
+      </p:bgPr>
+    </p:bg>
     <p:spTree>
       <p:nvGrpSpPr>
         <p:cNvPr id="1" name=""/>
@@ -6712,22 +6759,27 @@
             <p:ph type="title"/>
           </p:nvPr>
         </p:nvSpPr>
-        <p:spPr/>
-        <p:txBody>
-          <a:bodyPr/>
-          <a:lstStyle/>
-          <a:p>
-            <a:r>
-              <a:rPr lang="en-US" dirty="0"/>
-              <a:t>Who Should Use </a:t>
-            </a:r>
-            <a:r>
-              <a:rPr lang="en-US" dirty="0" err="1"/>
-              <a:t>GraphViz</a:t>
-            </a:r>
-            <a:r>
-              <a:rPr lang="en-US" dirty="0"/>
-              <a:t>?</a:t>
+        <p:spPr>
+          <a:xfrm>
+            <a:off x="838200" y="365125"/>
+            <a:ext cx="7958667" cy="1137104"/>
+          </a:xfrm>
+        </p:spPr>
+        <p:txBody>
+          <a:bodyPr anchor="b">
+            <a:normAutofit/>
+          </a:bodyPr>
+          <a:lstStyle/>
+          <a:p>
+            <a:r>
+              <a:rPr lang="en-US" sz="4400">
+                <a:solidFill>
+                  <a:schemeClr val="tx1">
+                    <a:lumMod val="95000"/>
+                  </a:schemeClr>
+                </a:solidFill>
+              </a:rPr>
+              <a:t>Who Should Use GraphViz?</a:t>
             </a:r>
           </a:p>
         </p:txBody>
@@ -6748,50 +6800,105 @@
             <p:ph idx="1"/>
           </p:nvPr>
         </p:nvSpPr>
-        <p:spPr/>
-        <p:txBody>
-          <a:bodyPr/>
-          <a:lstStyle/>
-          <a:p>
-            <a:r>
-              <a:rPr lang="en-US" dirty="0"/>
+        <p:spPr>
+          <a:xfrm>
+            <a:off x="838200" y="1825625"/>
+            <a:ext cx="7958667" cy="4351338"/>
+          </a:xfrm>
+        </p:spPr>
+        <p:txBody>
+          <a:bodyPr>
+            <a:normAutofit/>
+          </a:bodyPr>
+          <a:lstStyle/>
+          <a:p>
+            <a:r>
+              <a:rPr lang="en-US" sz="2400">
+                <a:solidFill>
+                  <a:schemeClr val="tx1">
+                    <a:lumMod val="95000"/>
+                  </a:schemeClr>
+                </a:solidFill>
+              </a:rPr>
               <a:t>People who suck at drawing</a:t>
             </a:r>
           </a:p>
           <a:p>
             <a:r>
-              <a:rPr lang="en-US" dirty="0"/>
+              <a:rPr lang="en-US" sz="2400">
+                <a:solidFill>
+                  <a:schemeClr val="tx1">
+                    <a:lumMod val="95000"/>
+                  </a:schemeClr>
+                </a:solidFill>
+              </a:rPr>
               <a:t>People who like source control</a:t>
             </a:r>
           </a:p>
           <a:p>
             <a:r>
-              <a:rPr lang="en-US" dirty="0"/>
+              <a:rPr lang="en-US" sz="2400">
+                <a:solidFill>
+                  <a:schemeClr val="tx1">
+                    <a:lumMod val="95000"/>
+                  </a:schemeClr>
+                </a:solidFill>
+              </a:rPr>
               <a:t>Nerds</a:t>
             </a:r>
           </a:p>
           <a:p>
             <a:r>
-              <a:rPr lang="en-US" dirty="0"/>
+              <a:rPr lang="en-US" sz="2400">
+                <a:solidFill>
+                  <a:schemeClr val="tx1">
+                    <a:lumMod val="95000"/>
+                  </a:schemeClr>
+                </a:solidFill>
+              </a:rPr>
               <a:t>People that prefer open-source tools </a:t>
             </a:r>
             <a:br>
-              <a:rPr lang="en-US" dirty="0"/>
+              <a:rPr lang="en-US" sz="2400">
+                <a:solidFill>
+                  <a:schemeClr val="tx1">
+                    <a:lumMod val="95000"/>
+                  </a:schemeClr>
+                </a:solidFill>
+              </a:rPr>
             </a:br>
             <a:r>
-              <a:rPr lang="en-US" i="1" dirty="0"/>
+              <a:rPr lang="en-US" sz="2400" i="1">
+                <a:solidFill>
+                  <a:schemeClr val="tx1">
+                    <a:lumMod val="95000"/>
+                  </a:schemeClr>
+                </a:solidFill>
+              </a:rPr>
               <a:t>(Common Public License Version 1.0)</a:t>
             </a:r>
           </a:p>
           <a:p>
             <a:r>
-              <a:rPr lang="en-US" dirty="0"/>
+              <a:rPr lang="en-US" sz="2400">
+                <a:solidFill>
+                  <a:schemeClr val="tx1">
+                    <a:lumMod val="95000"/>
+                  </a:schemeClr>
+                </a:solidFill>
+              </a:rPr>
               <a:t>People interested in a graphing/charting solution that integrates well with LaTeX</a:t>
             </a:r>
           </a:p>
           <a:p>
             <a:r>
-              <a:rPr lang="en-US" dirty="0"/>
+              <a:rPr lang="en-US" sz="2400">
+                <a:solidFill>
+                  <a:schemeClr val="tx1">
+                    <a:lumMod val="95000"/>
+                  </a:schemeClr>
+                </a:solidFill>
+              </a:rPr>
               <a:t>People who don’t like Visio</a:t>
             </a:r>
           </a:p>
@@ -6813,6 +6920,21 @@
 <file path=ppt/slides/slide6.xml><?xml version="1.0" encoding="utf-8"?>
 <p:sld xmlns:a="http://schemas.openxmlformats.org/drawingml/2006/main" xmlns:r="http://schemas.openxmlformats.org/officeDocument/2006/relationships" xmlns:p="http://schemas.openxmlformats.org/presentationml/2006/main">
   <p:cSld>
+    <p:bg>
+      <p:bgPr>
+        <a:blipFill dpi="0" rotWithShape="1">
+          <a:blip r:embed="rId2">
+            <a:lum/>
+            <a:extLst/>
+          </a:blip>
+          <a:srcRect/>
+          <a:stretch>
+            <a:fillRect/>
+          </a:stretch>
+        </a:blipFill>
+        <a:effectLst/>
+      </p:bgPr>
+    </p:bg>
     <p:spTree>
       <p:nvGrpSpPr>
         <p:cNvPr id="1" name=""/>
@@ -6843,13 +6965,26 @@
             <p:ph type="title"/>
           </p:nvPr>
         </p:nvSpPr>
-        <p:spPr/>
-        <p:txBody>
-          <a:bodyPr/>
-          <a:lstStyle/>
-          <a:p>
-            <a:r>
-              <a:rPr lang="en-US" dirty="0"/>
+        <p:spPr>
+          <a:xfrm>
+            <a:off x="838200" y="365125"/>
+            <a:ext cx="7958667" cy="1137104"/>
+          </a:xfrm>
+        </p:spPr>
+        <p:txBody>
+          <a:bodyPr anchor="b">
+            <a:normAutofit/>
+          </a:bodyPr>
+          <a:lstStyle/>
+          <a:p>
+            <a:r>
+              <a:rPr lang="en-US" sz="4400">
+                <a:solidFill>
+                  <a:schemeClr val="tx1">
+                    <a:lumMod val="95000"/>
+                  </a:schemeClr>
+                </a:solidFill>
+              </a:rPr>
               <a:t>Resources</a:t>
             </a:r>
           </a:p>
@@ -6871,77 +7006,192 @@
             <p:ph idx="1"/>
           </p:nvPr>
         </p:nvSpPr>
-        <p:spPr/>
-        <p:txBody>
-          <a:bodyPr/>
-          <a:lstStyle/>
-          <a:p>
-            <a:r>
-              <a:rPr lang="en-US" dirty="0"/>
+        <p:spPr>
+          <a:xfrm>
+            <a:off x="838200" y="1825625"/>
+            <a:ext cx="7958667" cy="4351338"/>
+          </a:xfrm>
+        </p:spPr>
+        <p:txBody>
+          <a:bodyPr>
+            <a:normAutofit/>
+          </a:bodyPr>
+          <a:lstStyle/>
+          <a:p>
+            <a:r>
+              <a:rPr lang="en-US" sz="2400" dirty="0">
+                <a:solidFill>
+                  <a:schemeClr val="tx1">
+                    <a:lumMod val="95000"/>
+                  </a:schemeClr>
+                </a:solidFill>
+              </a:rPr>
               <a:t>GraphViz.org</a:t>
             </a:r>
             <a:br>
-              <a:rPr lang="en-US" dirty="0"/>
+              <a:rPr lang="en-US" sz="2400" dirty="0">
+                <a:solidFill>
+                  <a:schemeClr val="tx1">
+                    <a:lumMod val="95000"/>
+                  </a:schemeClr>
+                </a:solidFill>
+              </a:rPr>
             </a:br>
             <a:r>
-              <a:rPr lang="en-US" i="1" dirty="0"/>
+              <a:rPr lang="en-US" sz="2400" i="1" dirty="0">
+                <a:solidFill>
+                  <a:schemeClr val="tx1">
+                    <a:lumMod val="95000"/>
+                  </a:schemeClr>
+                </a:solidFill>
+              </a:rPr>
               <a:t>the base site from the creators</a:t>
             </a:r>
-            <a:endParaRPr lang="en-US" dirty="0"/>
-          </a:p>
-          <a:p>
-            <a:r>
-              <a:rPr lang="en-US" dirty="0" err="1"/>
+            <a:endParaRPr lang="en-US" sz="2400" dirty="0">
+              <a:solidFill>
+                <a:schemeClr val="tx1">
+                  <a:lumMod val="95000"/>
+                </a:schemeClr>
+              </a:solidFill>
+            </a:endParaRPr>
+          </a:p>
+          <a:p>
+            <a:r>
+              <a:rPr lang="en-US" sz="2400" dirty="0" err="1">
+                <a:solidFill>
+                  <a:schemeClr val="tx1">
+                    <a:lumMod val="95000"/>
+                  </a:schemeClr>
+                </a:solidFill>
+              </a:rPr>
               <a:t>GraphViz</a:t>
             </a:r>
             <a:r>
-              <a:rPr lang="en-US" dirty="0"/>
+              <a:rPr lang="en-US" sz="2400" dirty="0">
+                <a:solidFill>
+                  <a:schemeClr val="tx1">
+                    <a:lumMod val="95000"/>
+                  </a:schemeClr>
+                </a:solidFill>
+              </a:rPr>
               <a:t> Pocket Reference – (graphs.grevian.org)</a:t>
             </a:r>
             <a:br>
-              <a:rPr lang="en-US" dirty="0"/>
+              <a:rPr lang="en-US" sz="2400" dirty="0">
+                <a:solidFill>
+                  <a:schemeClr val="tx1">
+                    <a:lumMod val="95000"/>
+                  </a:schemeClr>
+                </a:solidFill>
+              </a:rPr>
             </a:br>
             <a:r>
-              <a:rPr lang="en-US" i="1" dirty="0"/>
+              <a:rPr lang="en-US" sz="2400" i="1" dirty="0">
+                <a:solidFill>
+                  <a:schemeClr val="tx1">
+                    <a:lumMod val="95000"/>
+                  </a:schemeClr>
+                </a:solidFill>
+              </a:rPr>
               <a:t>by Josh Hayes-Sheen</a:t>
             </a:r>
-            <a:endParaRPr lang="en-US" dirty="0"/>
-          </a:p>
-          <a:p>
-            <a:r>
-              <a:rPr lang="en-US" dirty="0"/>
+            <a:endParaRPr lang="en-US" sz="2400" dirty="0">
+              <a:solidFill>
+                <a:schemeClr val="tx1">
+                  <a:lumMod val="95000"/>
+                </a:schemeClr>
+              </a:solidFill>
+            </a:endParaRPr>
+          </a:p>
+          <a:p>
+            <a:r>
+              <a:rPr lang="en-US" sz="2400" dirty="0">
+                <a:solidFill>
+                  <a:schemeClr val="tx1">
+                    <a:lumMod val="95000"/>
+                  </a:schemeClr>
+                </a:solidFill>
+              </a:rPr>
               <a:t>WebGraphViz.com</a:t>
             </a:r>
             <a:br>
-              <a:rPr lang="en-US" dirty="0"/>
+              <a:rPr lang="en-US" sz="2400" dirty="0">
+                <a:solidFill>
+                  <a:schemeClr val="tx1">
+                    <a:lumMod val="95000"/>
+                  </a:schemeClr>
+                </a:solidFill>
+              </a:rPr>
             </a:br>
             <a:r>
-              <a:rPr lang="en-US" i="1" dirty="0"/>
+              <a:rPr lang="en-US" sz="2400" i="1" dirty="0">
+                <a:solidFill>
+                  <a:schemeClr val="tx1">
+                    <a:lumMod val="95000"/>
+                  </a:schemeClr>
+                </a:solidFill>
+              </a:rPr>
               <a:t>a web-based tool</a:t>
             </a:r>
           </a:p>
           <a:p>
             <a:r>
-              <a:rPr lang="en-US" dirty="0" err="1"/>
+              <a:rPr lang="en-US" sz="2400" dirty="0" err="1">
+                <a:solidFill>
+                  <a:schemeClr val="tx1">
+                    <a:lumMod val="95000"/>
+                  </a:schemeClr>
+                </a:solidFill>
+              </a:rPr>
               <a:t>GraphViz</a:t>
             </a:r>
             <a:r>
-              <a:rPr lang="en-US" dirty="0"/>
+              <a:rPr lang="en-US" sz="2400" dirty="0">
+                <a:solidFill>
+                  <a:schemeClr val="tx1">
+                    <a:lumMod val="95000"/>
+                  </a:schemeClr>
+                </a:solidFill>
+              </a:rPr>
               <a:t> Preview – Visual Studio Code Plugin</a:t>
             </a:r>
             <a:br>
-              <a:rPr lang="en-US" dirty="0"/>
+              <a:rPr lang="en-US" sz="2400" dirty="0">
+                <a:solidFill>
+                  <a:schemeClr val="tx1">
+                    <a:lumMod val="95000"/>
+                  </a:schemeClr>
+                </a:solidFill>
+              </a:rPr>
             </a:br>
             <a:r>
-              <a:rPr lang="en-US" dirty="0"/>
+              <a:rPr lang="en-US" sz="2400" dirty="0">
+                <a:solidFill>
+                  <a:schemeClr val="tx1">
+                    <a:lumMod val="95000"/>
+                  </a:schemeClr>
+                </a:solidFill>
+              </a:rPr>
               <a:t>(</a:t>
             </a:r>
             <a:r>
-              <a:rPr lang="en-US" sz="2000" dirty="0"/>
+              <a:rPr lang="en-US" sz="1600" dirty="0">
+                <a:solidFill>
+                  <a:schemeClr val="tx1">
+                    <a:lumMod val="95000"/>
+                  </a:schemeClr>
+                </a:solidFill>
+              </a:rPr>
               <a:t>https://marketplace.visualstudio.com/items?itemName=EFanZh.graphviz-preview</a:t>
             </a:r>
             <a:r>
-              <a:rPr lang="en-US" dirty="0"/>
+              <a:rPr lang="en-US" sz="2400" dirty="0">
+                <a:solidFill>
+                  <a:schemeClr val="tx1">
+                    <a:lumMod val="95000"/>
+                  </a:schemeClr>
+                </a:solidFill>
+              </a:rPr>
               <a:t>)</a:t>
             </a:r>
           </a:p>
@@ -6951,6 +7201,224 @@
     <p:extLst>
       <p:ext uri="{BB962C8B-B14F-4D97-AF65-F5344CB8AC3E}">
         <p14:creationId xmlns:p14="http://schemas.microsoft.com/office/powerpoint/2010/main" val="2129563506"/>
+      </p:ext>
+    </p:extLst>
+  </p:cSld>
+  <p:clrMapOvr>
+    <a:masterClrMapping/>
+  </p:clrMapOvr>
+</p:sld>
+</file>
+
+<file path=ppt/slides/slide7.xml><?xml version="1.0" encoding="utf-8"?>
+<p:sld xmlns:a="http://schemas.openxmlformats.org/drawingml/2006/main" xmlns:r="http://schemas.openxmlformats.org/officeDocument/2006/relationships" xmlns:p="http://schemas.openxmlformats.org/presentationml/2006/main">
+  <p:cSld>
+    <p:bg>
+      <p:bgPr>
+        <a:blipFill dpi="0" rotWithShape="1">
+          <a:blip r:embed="rId2">
+            <a:lum/>
+            <a:extLst/>
+          </a:blip>
+          <a:srcRect/>
+          <a:stretch>
+            <a:fillRect/>
+          </a:stretch>
+        </a:blipFill>
+        <a:effectLst/>
+      </p:bgPr>
+    </p:bg>
+    <p:spTree>
+      <p:nvGrpSpPr>
+        <p:cNvPr id="1" name=""/>
+        <p:cNvGrpSpPr/>
+        <p:nvPr/>
+      </p:nvGrpSpPr>
+      <p:grpSpPr>
+        <a:xfrm>
+          <a:off x="0" y="0"/>
+          <a:ext cx="0" cy="0"/>
+          <a:chOff x="0" y="0"/>
+          <a:chExt cx="0" cy="0"/>
+        </a:xfrm>
+      </p:grpSpPr>
+      <p:sp>
+        <p:nvSpPr>
+          <p:cNvPr id="2" name="Title 1">
+            <a:extLst>
+              <a:ext uri="{FF2B5EF4-FFF2-40B4-BE49-F238E27FC236}">
+                <a16:creationId xmlns:a16="http://schemas.microsoft.com/office/drawing/2014/main" id="{522CEEE6-AAF2-4A81-BE28-44E6B2B115ED}"/>
+              </a:ext>
+            </a:extLst>
+          </p:cNvPr>
+          <p:cNvSpPr>
+            <a:spLocks noGrp="1"/>
+          </p:cNvSpPr>
+          <p:nvPr>
+            <p:ph type="title"/>
+          </p:nvPr>
+        </p:nvSpPr>
+        <p:spPr>
+          <a:xfrm>
+            <a:off x="838200" y="5145932"/>
+            <a:ext cx="10515600" cy="959586"/>
+          </a:xfrm>
+        </p:spPr>
+        <p:txBody>
+          <a:bodyPr vert="horz" wrap="none" lIns="91440" tIns="45720" rIns="91440" bIns="45720" rtlCol="0" anchor="t">
+            <a:normAutofit/>
+          </a:bodyPr>
+          <a:lstStyle/>
+          <a:p>
+            <a:pPr algn="r"/>
+            <a:r>
+              <a:rPr lang="en-US" sz="4000" spc="-300">
+                <a:gradFill flip="none" rotWithShape="1">
+                  <a:gsLst>
+                    <a:gs pos="32000">
+                      <a:schemeClr val="tx1">
+                        <a:lumMod val="89000"/>
+                      </a:schemeClr>
+                    </a:gs>
+                    <a:gs pos="0">
+                      <a:schemeClr val="bg1">
+                        <a:lumMod val="41000"/>
+                        <a:lumOff val="59000"/>
+                      </a:schemeClr>
+                    </a:gs>
+                    <a:gs pos="100000">
+                      <a:schemeClr val="tx2">
+                        <a:lumMod val="0"/>
+                        <a:lumOff val="100000"/>
+                      </a:schemeClr>
+                    </a:gs>
+                  </a:gsLst>
+                  <a:lin ang="8100000" scaled="1"/>
+                  <a:tileRect/>
+                </a:gradFill>
+                <a:effectLst>
+                  <a:outerShdw blurRad="469900" dist="342900" dir="5400000" sy="-20000" rotWithShape="0">
+                    <a:prstClr val="black">
+                      <a:alpha val="66000"/>
+                    </a:prstClr>
+                  </a:outerShdw>
+                </a:effectLst>
+              </a:rPr>
+              <a:t>Presentation Resources</a:t>
+            </a:r>
+          </a:p>
+        </p:txBody>
+      </p:sp>
+      <p:sp>
+        <p:nvSpPr>
+          <p:cNvPr id="3" name="Content Placeholder 2">
+            <a:extLst>
+              <a:ext uri="{FF2B5EF4-FFF2-40B4-BE49-F238E27FC236}">
+                <a16:creationId xmlns:a16="http://schemas.microsoft.com/office/drawing/2014/main" id="{71D8C61D-4AF1-4B90-ACDC-20B2CAB4F902}"/>
+              </a:ext>
+            </a:extLst>
+          </p:cNvPr>
+          <p:cNvSpPr>
+            <a:spLocks noGrp="1"/>
+          </p:cNvSpPr>
+          <p:nvPr>
+            <p:ph idx="1"/>
+          </p:nvPr>
+        </p:nvSpPr>
+        <p:spPr>
+          <a:xfrm>
+            <a:off x="2209799" y="4533089"/>
+            <a:ext cx="9144000" cy="612843"/>
+          </a:xfrm>
+        </p:spPr>
+        <p:txBody>
+          <a:bodyPr vert="horz" lIns="91440" tIns="45720" rIns="91440" bIns="45720" rtlCol="0" anchor="b">
+            <a:normAutofit/>
+          </a:bodyPr>
+          <a:lstStyle/>
+          <a:p>
+            <a:pPr marL="0" indent="0" algn="r">
+              <a:buNone/>
+            </a:pPr>
+            <a:r>
+              <a:rPr lang="en-US" sz="2000">
+                <a:gradFill flip="none" rotWithShape="1">
+                  <a:gsLst>
+                    <a:gs pos="15000">
+                      <a:schemeClr val="tx2"/>
+                    </a:gs>
+                    <a:gs pos="73000">
+                      <a:schemeClr val="tx2">
+                        <a:lumMod val="60000"/>
+                        <a:lumOff val="40000"/>
+                      </a:schemeClr>
+                    </a:gs>
+                    <a:gs pos="0">
+                      <a:schemeClr val="tx2">
+                        <a:lumMod val="90000"/>
+                        <a:lumOff val="10000"/>
+                      </a:schemeClr>
+                    </a:gs>
+                    <a:gs pos="100000">
+                      <a:schemeClr val="tx2">
+                        <a:lumMod val="0"/>
+                        <a:lumOff val="100000"/>
+                      </a:schemeClr>
+                    </a:gs>
+                  </a:gsLst>
+                  <a:lin ang="16200000" scaled="1"/>
+                  <a:tileRect/>
+                </a:gradFill>
+                <a:latin typeface="+mj-lt"/>
+              </a:rPr>
+              <a:t>https://github.com/whoiskevinrich/GraphViz-LightningTalk</a:t>
+            </a:r>
+          </a:p>
+        </p:txBody>
+      </p:sp>
+      <p:pic>
+        <p:nvPicPr>
+          <p:cNvPr id="7" name="Graphic 6" descr="Teacher">
+            <a:extLst>
+              <a:ext uri="{FF2B5EF4-FFF2-40B4-BE49-F238E27FC236}">
+                <a16:creationId xmlns:a16="http://schemas.microsoft.com/office/drawing/2014/main" id="{500A75E3-B46F-480A-8377-816C57EA0780}"/>
+              </a:ext>
+            </a:extLst>
+          </p:cNvPr>
+          <p:cNvPicPr>
+            <a:picLocks noChangeAspect="1"/>
+          </p:cNvPicPr>
+          <p:nvPr/>
+        </p:nvPicPr>
+        <p:blipFill>
+          <a:blip r:embed="rId3">
+            <a:extLst>
+              <a:ext uri="{28A0092B-C50C-407E-A947-70E740481C1C}">
+                <a14:useLocalDpi xmlns:a14="http://schemas.microsoft.com/office/drawing/2010/main" val="0"/>
+              </a:ext>
+              <a:ext uri="{96DAC541-7B7A-43D3-8B79-37D633B846F1}">
+                <asvg:svgBlip xmlns:asvg="http://schemas.microsoft.com/office/drawing/2016/SVG/main" r:embed="rId4"/>
+              </a:ext>
+            </a:extLst>
+          </a:blip>
+          <a:stretch>
+            <a:fillRect/>
+          </a:stretch>
+        </p:blipFill>
+        <p:spPr>
+          <a:xfrm>
+            <a:off x="838201" y="643464"/>
+            <a:ext cx="3889625" cy="3889625"/>
+          </a:xfrm>
+          <a:prstGeom prst="rect">
+            <a:avLst/>
+          </a:prstGeom>
+        </p:spPr>
+      </p:pic>
+    </p:spTree>
+    <p:extLst>
+      <p:ext uri="{BB962C8B-B14F-4D97-AF65-F5344CB8AC3E}">
+        <p14:creationId xmlns:p14="http://schemas.microsoft.com/office/powerpoint/2010/main" val="1149300295"/>
       </p:ext>
     </p:extLst>
   </p:cSld>

</xml_diff>